<commit_message>
david added imsLink_Capture code
modify document

@sugar 1227
</commit_message>
<xml_diff>
--- a/_6.ims.tmp/內視鏡系統畫面v1.pptx
+++ b/_6.ims.tmp/內視鏡系統畫面v1.pptx
@@ -206,7 +206,7 @@
             <a:fld id="{9A58746A-7433-4E44-BB5D-246805387875}" type="datetimeFigureOut">
               <a:rPr lang="zh-TW" altLang="en-US" smtClean="0"/>
               <a:pPr/>
-              <a:t>2019/10/25</a:t>
+              <a:t>2019/12/26</a:t>
             </a:fld>
             <a:endParaRPr lang="zh-TW" altLang="en-US"/>
           </a:p>
@@ -544,7 +544,7 @@
                 </a:solidFill>
               </a:rPr>
               <a:pPr/>
-              <a:t>October 25, 2019</a:t>
+              <a:t>December 26, 2019</a:t>
             </a:fld>
             <a:endParaRPr lang="zh-TW" altLang="en-US" sz="3600" dirty="0">
               <a:solidFill>
@@ -932,7 +932,7 @@
                 </a:solidFill>
               </a:rPr>
               <a:pPr/>
-              <a:t>October 25, 2019</a:t>
+              <a:t>December 26, 2019</a:t>
             </a:fld>
             <a:endParaRPr lang="zh-TW" altLang="en-US" dirty="0">
               <a:solidFill>
@@ -1406,8 +1406,8 @@
         </p:nvSpPr>
         <p:spPr>
           <a:xfrm>
-            <a:off x="142844" y="857232"/>
-            <a:ext cx="6929486" cy="1200329"/>
+            <a:off x="142844" y="996719"/>
+            <a:ext cx="6929486" cy="646331"/>
           </a:xfrm>
           <a:prstGeom prst="rect">
             <a:avLst/>
@@ -1439,35 +1439,14 @@
                 <a:latin typeface="標楷體" pitchFamily="65" charset="-120"/>
                 <a:ea typeface="標楷體" pitchFamily="65" charset="-120"/>
               </a:rPr>
-              <a:t>分鐘，</a:t>
+              <a:t>分鐘，繼續顯示警告訊息，紅字閃爍</a:t>
             </a:r>
             <a:r>
               <a:rPr lang="zh-TW" altLang="en-US" dirty="0" smtClean="0">
                 <a:latin typeface="標楷體" pitchFamily="65" charset="-120"/>
                 <a:ea typeface="標楷體" pitchFamily="65" charset="-120"/>
               </a:rPr>
-              <a:t>繼續</a:t>
-            </a:r>
-            <a:r>
-              <a:rPr lang="zh-TW" altLang="en-US" dirty="0" smtClean="0">
-                <a:latin typeface="標楷體" pitchFamily="65" charset="-120"/>
-                <a:ea typeface="標楷體" pitchFamily="65" charset="-120"/>
-              </a:rPr>
-              <a:t>顯示</a:t>
-            </a:r>
-            <a:r>
-              <a:rPr lang="zh-TW" altLang="en-US" dirty="0" smtClean="0">
-                <a:latin typeface="標楷體" pitchFamily="65" charset="-120"/>
-                <a:ea typeface="標楷體" pitchFamily="65" charset="-120"/>
-              </a:rPr>
-              <a:t>警告訊息，紅</a:t>
-            </a:r>
-            <a:r>
-              <a:rPr lang="zh-TW" altLang="en-US" dirty="0" smtClean="0">
-                <a:latin typeface="標楷體" pitchFamily="65" charset="-120"/>
-                <a:ea typeface="標楷體" pitchFamily="65" charset="-120"/>
-              </a:rPr>
-              <a:t>字閃爍。</a:t>
+              <a:t>。</a:t>
             </a:r>
             <a:endParaRPr lang="en-US" altLang="zh-TW" dirty="0" smtClean="0">
               <a:latin typeface="標楷體" pitchFamily="65" charset="-120"/>
@@ -1480,48 +1459,22 @@
                 <a:latin typeface="標楷體" pitchFamily="65" charset="-120"/>
                 <a:ea typeface="標楷體" pitchFamily="65" charset="-120"/>
               </a:rPr>
-              <a:t>畫面貼上內視鏡過期</a:t>
+              <a:t>畫面貼上內視鏡過期訊息。內視鏡</a:t>
             </a:r>
             <a:r>
               <a:rPr lang="zh-TW" altLang="en-US" dirty="0" smtClean="0">
                 <a:latin typeface="標楷體" pitchFamily="65" charset="-120"/>
                 <a:ea typeface="標楷體" pitchFamily="65" charset="-120"/>
               </a:rPr>
-              <a:t>訊息。</a:t>
-            </a:r>
-            <a:endParaRPr lang="en-US" altLang="zh-TW" dirty="0" smtClean="0">
-              <a:latin typeface="標楷體" pitchFamily="65" charset="-120"/>
-              <a:ea typeface="標楷體" pitchFamily="65" charset="-120"/>
-            </a:endParaRPr>
-          </a:p>
-          <a:p>
+              <a:t>不要拔除，還是可以用</a:t>
+            </a:r>
             <a:r>
               <a:rPr lang="zh-TW" altLang="en-US" dirty="0" smtClean="0">
                 <a:latin typeface="標楷體" pitchFamily="65" charset="-120"/>
                 <a:ea typeface="標楷體" pitchFamily="65" charset="-120"/>
               </a:rPr>
-              <a:t>內視鏡不要拔除</a:t>
-            </a:r>
-            <a:r>
-              <a:rPr lang="zh-TW" altLang="en-US" dirty="0" smtClean="0">
-                <a:latin typeface="標楷體" pitchFamily="65" charset="-120"/>
-                <a:ea typeface="標楷體" pitchFamily="65" charset="-120"/>
-              </a:rPr>
-              <a:t>，還是</a:t>
-            </a:r>
-            <a:r>
-              <a:rPr lang="zh-TW" altLang="en-US" dirty="0" smtClean="0">
-                <a:latin typeface="標楷體" pitchFamily="65" charset="-120"/>
-                <a:ea typeface="標楷體" pitchFamily="65" charset="-120"/>
-              </a:rPr>
-              <a:t>可以用。</a:t>
-            </a:r>
-            <a:endParaRPr lang="en-US" altLang="zh-TW" dirty="0" smtClean="0">
-              <a:latin typeface="標楷體" pitchFamily="65" charset="-120"/>
-              <a:ea typeface="標楷體" pitchFamily="65" charset="-120"/>
-            </a:endParaRPr>
-          </a:p>
-          <a:p>
+              <a:t>。</a:t>
+            </a:r>
             <a:endParaRPr lang="en-US" altLang="zh-TW" dirty="0" smtClean="0">
               <a:latin typeface="標楷體" pitchFamily="65" charset="-120"/>
               <a:ea typeface="標楷體" pitchFamily="65" charset="-120"/>
@@ -1653,7 +1606,7 @@
         </p:nvSpPr>
         <p:spPr>
           <a:xfrm>
-            <a:off x="142844" y="1000108"/>
+            <a:off x="142844" y="1059404"/>
             <a:ext cx="6929486" cy="369332"/>
           </a:xfrm>
           <a:prstGeom prst="rect">
@@ -1763,7 +1716,7 @@
         </p:nvSpPr>
         <p:spPr>
           <a:xfrm>
-            <a:off x="142844" y="1000108"/>
+            <a:off x="142844" y="1068157"/>
             <a:ext cx="8215370" cy="646331"/>
           </a:xfrm>
           <a:prstGeom prst="rect">
@@ -1782,35 +1735,7 @@
                 <a:latin typeface="標楷體" pitchFamily="65" charset="-120"/>
                 <a:ea typeface="標楷體" pitchFamily="65" charset="-120"/>
               </a:rPr>
-              <a:t>內視鏡拔除再</a:t>
-            </a:r>
-            <a:r>
-              <a:rPr lang="zh-TW" altLang="en-US" smtClean="0">
-                <a:latin typeface="標楷體" pitchFamily="65" charset="-120"/>
-                <a:ea typeface="標楷體" pitchFamily="65" charset="-120"/>
-              </a:rPr>
-              <a:t>接上，如果系統</a:t>
-            </a:r>
-            <a:r>
-              <a:rPr lang="zh-TW" altLang="en-US" dirty="0" smtClean="0">
-                <a:latin typeface="標楷體" pitchFamily="65" charset="-120"/>
-                <a:ea typeface="標楷體" pitchFamily="65" charset="-120"/>
-              </a:rPr>
-              <a:t>發現內視鏡已</a:t>
-            </a:r>
-            <a:r>
-              <a:rPr lang="zh-TW" altLang="en-US" dirty="0" smtClean="0">
-                <a:latin typeface="標楷體" pitchFamily="65" charset="-120"/>
-                <a:ea typeface="標楷體" pitchFamily="65" charset="-120"/>
-              </a:rPr>
-              <a:t>過期，畫面貼上內視鏡過期訊息</a:t>
-            </a:r>
-            <a:r>
-              <a:rPr lang="zh-TW" altLang="en-US" dirty="0" smtClean="0">
-                <a:latin typeface="標楷體" pitchFamily="65" charset="-120"/>
-                <a:ea typeface="標楷體" pitchFamily="65" charset="-120"/>
-              </a:rPr>
-              <a:t>。</a:t>
+              <a:t>內視鏡拔除再接上，如果系統發現內視鏡已過期，畫面貼上內視鏡過期訊息。</a:t>
             </a:r>
             <a:endParaRPr lang="en-US" altLang="zh-TW" dirty="0" smtClean="0">
               <a:latin typeface="標楷體" pitchFamily="65" charset="-120"/>
@@ -1823,7 +1748,14 @@
                 <a:latin typeface="標楷體" pitchFamily="65" charset="-120"/>
                 <a:ea typeface="標楷體" pitchFamily="65" charset="-120"/>
               </a:rPr>
-              <a:t>不開燈，所以看不到畫面。</a:t>
+              <a:t>因為不</a:t>
+            </a:r>
+            <a:r>
+              <a:rPr lang="zh-TW" altLang="en-US" dirty="0" smtClean="0">
+                <a:latin typeface="標楷體" pitchFamily="65" charset="-120"/>
+                <a:ea typeface="標楷體" pitchFamily="65" charset="-120"/>
+              </a:rPr>
+              <a:t>開燈，所以看不到畫面。</a:t>
             </a:r>
             <a:endParaRPr lang="en-US" altLang="zh-TW" dirty="0" smtClean="0">
               <a:latin typeface="標楷體" pitchFamily="65" charset="-120"/>
@@ -1948,7 +1880,7 @@
         </p:nvSpPr>
         <p:spPr>
           <a:xfrm>
-            <a:off x="142844" y="1000108"/>
+            <a:off x="142844" y="1068157"/>
             <a:ext cx="8215370" cy="646331"/>
           </a:xfrm>
           <a:prstGeom prst="rect">
@@ -1967,28 +1899,7 @@
                 <a:latin typeface="標楷體" pitchFamily="65" charset="-120"/>
                 <a:ea typeface="標楷體" pitchFamily="65" charset="-120"/>
               </a:rPr>
-              <a:t>系統發現時間錯誤</a:t>
-            </a:r>
-            <a:r>
-              <a:rPr lang="zh-TW" altLang="en-US" dirty="0" smtClean="0">
-                <a:latin typeface="標楷體" pitchFamily="65" charset="-120"/>
-                <a:ea typeface="標楷體" pitchFamily="65" charset="-120"/>
-              </a:rPr>
-              <a:t>，</a:t>
-            </a:r>
-            <a:r>
-              <a:rPr lang="zh-TW" altLang="en-US" dirty="0" smtClean="0">
-                <a:latin typeface="標楷體" pitchFamily="65" charset="-120"/>
-                <a:ea typeface="標楷體" pitchFamily="65" charset="-120"/>
-              </a:rPr>
-              <a:t>畫面貼</a:t>
-            </a:r>
-            <a:r>
-              <a:rPr lang="zh-TW" altLang="en-US" dirty="0" smtClean="0">
-                <a:latin typeface="標楷體" pitchFamily="65" charset="-120"/>
-                <a:ea typeface="標楷體" pitchFamily="65" charset="-120"/>
-              </a:rPr>
-              <a:t>上電池失效訊息。</a:t>
+              <a:t>系統發現時間錯誤，畫面貼上電池失效訊息。</a:t>
             </a:r>
             <a:endParaRPr lang="en-US" altLang="zh-TW" dirty="0" smtClean="0">
               <a:latin typeface="標楷體" pitchFamily="65" charset="-120"/>
@@ -2001,7 +1912,21 @@
                 <a:latin typeface="標楷體" pitchFamily="65" charset="-120"/>
                 <a:ea typeface="標楷體" pitchFamily="65" charset="-120"/>
               </a:rPr>
-              <a:t>不開燈，所以看不到畫面。</a:t>
+              <a:t>因為</a:t>
+            </a:r>
+            <a:r>
+              <a:rPr lang="zh-TW" altLang="en-US" dirty="0" smtClean="0">
+                <a:latin typeface="標楷體" pitchFamily="65" charset="-120"/>
+                <a:ea typeface="標楷體" pitchFamily="65" charset="-120"/>
+              </a:rPr>
+              <a:t>不</a:t>
+            </a:r>
+            <a:r>
+              <a:rPr lang="zh-TW" altLang="en-US" dirty="0" smtClean="0">
+                <a:latin typeface="標楷體" pitchFamily="65" charset="-120"/>
+                <a:ea typeface="標楷體" pitchFamily="65" charset="-120"/>
+              </a:rPr>
+              <a:t>開燈，所以看不到畫面。</a:t>
             </a:r>
             <a:endParaRPr lang="en-US" altLang="zh-TW" dirty="0" smtClean="0">
               <a:latin typeface="標楷體" pitchFamily="65" charset="-120"/>
@@ -2064,11 +1989,7 @@
           <a:p>
             <a:r>
               <a:rPr lang="zh-TW" altLang="en-US" dirty="0" smtClean="0"/>
-              <a:t>工廠</a:t>
-            </a:r>
-            <a:r>
-              <a:rPr lang="zh-TW" altLang="en-US" dirty="0" smtClean="0"/>
-              <a:t>模式</a:t>
+              <a:t>工廠模式</a:t>
             </a:r>
             <a:endParaRPr lang="zh-TW" altLang="en-US" dirty="0"/>
           </a:p>
@@ -2082,7 +2003,7 @@
         </p:nvSpPr>
         <p:spPr>
           <a:xfrm>
-            <a:off x="142844" y="1000108"/>
+            <a:off x="142844" y="1059404"/>
             <a:ext cx="6929486" cy="369332"/>
           </a:xfrm>
           <a:prstGeom prst="rect">
@@ -2143,14 +2064,7 @@
                 <a:latin typeface="標楷體" pitchFamily="65" charset="-120"/>
                 <a:ea typeface="標楷體" pitchFamily="65" charset="-120"/>
               </a:rPr>
-              <a:t>，進入工廠模式</a:t>
-            </a:r>
-            <a:r>
-              <a:rPr lang="zh-TW" altLang="en-US" dirty="0" smtClean="0">
-                <a:latin typeface="標楷體" pitchFamily="65" charset="-120"/>
-                <a:ea typeface="標楷體" pitchFamily="65" charset="-120"/>
-              </a:rPr>
-              <a:t>。</a:t>
+              <a:t>，進入工廠模式。</a:t>
             </a:r>
             <a:endParaRPr lang="en-US" altLang="zh-TW" dirty="0" smtClean="0">
               <a:latin typeface="標楷體" pitchFamily="65" charset="-120"/>
@@ -2161,7 +2075,7 @@
       </p:sp>
       <p:pic>
         <p:nvPicPr>
-          <p:cNvPr id="4" name="圖片 3" descr="10eng.ims_image_20191024_201133.jpg"/>
+          <p:cNvPr id="5" name="圖片 4" descr="ims_image_20191226_145503.bmp"/>
           <p:cNvPicPr>
             <a:picLocks noChangeAspect="1"/>
           </p:cNvPicPr>
@@ -2175,8 +2089,8 @@
         </p:blipFill>
         <p:spPr>
           <a:xfrm>
-            <a:off x="108000" y="1764000"/>
-            <a:ext cx="8929916" cy="5023078"/>
+            <a:off x="142844" y="1785926"/>
+            <a:ext cx="8890062" cy="5000660"/>
           </a:xfrm>
           <a:prstGeom prst="rect">
             <a:avLst/>
@@ -2251,7 +2165,7 @@
         </p:nvSpPr>
         <p:spPr>
           <a:xfrm>
-            <a:off x="142844" y="1000108"/>
+            <a:off x="142844" y="1071546"/>
             <a:ext cx="6929486" cy="369332"/>
           </a:xfrm>
           <a:prstGeom prst="rect">
@@ -2270,7 +2184,21 @@
                 <a:latin typeface="標楷體" pitchFamily="65" charset="-120"/>
                 <a:ea typeface="標楷體" pitchFamily="65" charset="-120"/>
               </a:rPr>
-              <a:t>相較於正式版，畫面多了下方</a:t>
+              <a:t>相較於正式版</a:t>
+            </a:r>
+            <a:r>
+              <a:rPr lang="zh-TW" altLang="en-US" dirty="0" smtClean="0">
+                <a:latin typeface="標楷體" pitchFamily="65" charset="-120"/>
+                <a:ea typeface="標楷體" pitchFamily="65" charset="-120"/>
+              </a:rPr>
+              <a:t>，業務版畫面</a:t>
+            </a:r>
+            <a:r>
+              <a:rPr lang="zh-TW" altLang="en-US" dirty="0" smtClean="0">
+                <a:latin typeface="標楷體" pitchFamily="65" charset="-120"/>
+                <a:ea typeface="標楷體" pitchFamily="65" charset="-120"/>
+              </a:rPr>
+              <a:t>多了下方</a:t>
             </a:r>
             <a:r>
               <a:rPr lang="en-US" altLang="zh-TW" dirty="0" smtClean="0">
@@ -2385,7 +2313,7 @@
         </p:nvSpPr>
         <p:spPr>
           <a:xfrm>
-            <a:off x="142844" y="1000108"/>
+            <a:off x="142844" y="1068157"/>
             <a:ext cx="6929486" cy="646331"/>
           </a:xfrm>
           <a:prstGeom prst="rect">
@@ -2404,21 +2332,7 @@
                 <a:latin typeface="標楷體" pitchFamily="65" charset="-120"/>
                 <a:ea typeface="標楷體" pitchFamily="65" charset="-120"/>
               </a:rPr>
-              <a:t>畫面</a:t>
-            </a:r>
-            <a:r>
-              <a:rPr lang="zh-TW" altLang="en-US" dirty="0" smtClean="0">
-                <a:latin typeface="標楷體" pitchFamily="65" charset="-120"/>
-                <a:ea typeface="標楷體" pitchFamily="65" charset="-120"/>
-              </a:rPr>
-              <a:t>左上方</a:t>
-            </a:r>
-            <a:r>
-              <a:rPr lang="zh-TW" altLang="en-US" dirty="0" smtClean="0">
-                <a:latin typeface="標楷體" pitchFamily="65" charset="-120"/>
-                <a:ea typeface="標楷體" pitchFamily="65" charset="-120"/>
-              </a:rPr>
-              <a:t>顯示現在時間。</a:t>
+              <a:t>畫面左上方顯示現在時間。</a:t>
             </a:r>
             <a:endParaRPr lang="en-US" altLang="zh-TW" dirty="0" smtClean="0">
               <a:latin typeface="標楷體" pitchFamily="65" charset="-120"/>
@@ -2431,70 +2345,7 @@
                 <a:latin typeface="標楷體" pitchFamily="65" charset="-120"/>
                 <a:ea typeface="標楷體" pitchFamily="65" charset="-120"/>
               </a:rPr>
-              <a:t>畫面下方</a:t>
-            </a:r>
-            <a:r>
-              <a:rPr lang="zh-TW" altLang="en-US" dirty="0" smtClean="0">
-                <a:latin typeface="標楷體" pitchFamily="65" charset="-120"/>
-                <a:ea typeface="標楷體" pitchFamily="65" charset="-120"/>
-              </a:rPr>
-              <a:t>顯示內視鏡序號、</a:t>
-            </a:r>
-            <a:r>
-              <a:rPr lang="zh-TW" altLang="en-US" dirty="0" smtClean="0">
-                <a:latin typeface="標楷體" pitchFamily="65" charset="-120"/>
-                <a:ea typeface="標楷體" pitchFamily="65" charset="-120"/>
-              </a:rPr>
-              <a:t>內視鏡</a:t>
-            </a:r>
-            <a:r>
-              <a:rPr lang="zh-TW" altLang="en-US" dirty="0" smtClean="0">
-                <a:latin typeface="標楷體" pitchFamily="65" charset="-120"/>
-                <a:ea typeface="標楷體" pitchFamily="65" charset="-120"/>
-              </a:rPr>
-              <a:t>已使用</a:t>
-            </a:r>
-            <a:r>
-              <a:rPr lang="zh-TW" altLang="en-US" dirty="0" smtClean="0">
-                <a:latin typeface="標楷體" pitchFamily="65" charset="-120"/>
-                <a:ea typeface="標楷體" pitchFamily="65" charset="-120"/>
-              </a:rPr>
-              <a:t>時間</a:t>
-            </a:r>
-            <a:r>
-              <a:rPr lang="zh-TW" altLang="en-US" dirty="0" smtClean="0">
-                <a:latin typeface="標楷體" pitchFamily="65" charset="-120"/>
-                <a:ea typeface="標楷體" pitchFamily="65" charset="-120"/>
-              </a:rPr>
-              <a:t>、</a:t>
-            </a:r>
-            <a:r>
-              <a:rPr lang="zh-TW" altLang="en-US" dirty="0" smtClean="0">
-                <a:latin typeface="標楷體" pitchFamily="65" charset="-120"/>
-                <a:ea typeface="標楷體" pitchFamily="65" charset="-120"/>
-              </a:rPr>
-              <a:t>內視鏡</a:t>
-            </a:r>
-            <a:r>
-              <a:rPr lang="zh-TW" altLang="en-US" dirty="0" smtClean="0">
-                <a:latin typeface="標楷體" pitchFamily="65" charset="-120"/>
-                <a:ea typeface="標楷體" pitchFamily="65" charset="-120"/>
-              </a:rPr>
-              <a:t>可使用</a:t>
-            </a:r>
-            <a:r>
-              <a:rPr lang="zh-TW" altLang="en-US" dirty="0" smtClean="0">
-                <a:latin typeface="標楷體" pitchFamily="65" charset="-120"/>
-                <a:ea typeface="標楷體" pitchFamily="65" charset="-120"/>
-              </a:rPr>
-              <a:t>時間</a:t>
-            </a:r>
-            <a:r>
-              <a:rPr lang="zh-TW" altLang="en-US" dirty="0" smtClean="0">
-                <a:latin typeface="標楷體" pitchFamily="65" charset="-120"/>
-                <a:ea typeface="標楷體" pitchFamily="65" charset="-120"/>
-              </a:rPr>
-              <a:t>。</a:t>
+              <a:t>畫面下方顯示內視鏡序號、內視鏡已使用時間、內視鏡可使用時間。</a:t>
             </a:r>
             <a:endParaRPr lang="en-US" altLang="zh-TW" dirty="0" smtClean="0">
               <a:latin typeface="標楷體" pitchFamily="65" charset="-120"/>
@@ -2581,11 +2432,7 @@
           <a:p>
             <a:r>
               <a:rPr lang="zh-TW" altLang="en-US" dirty="0" smtClean="0"/>
-              <a:t>未接</a:t>
-            </a:r>
-            <a:r>
-              <a:rPr lang="zh-TW" altLang="en-US" dirty="0" smtClean="0"/>
-              <a:t>連接器</a:t>
+              <a:t>未接連接器</a:t>
             </a:r>
             <a:endParaRPr lang="zh-TW" altLang="en-US" dirty="0"/>
           </a:p>
@@ -2791,7 +2638,7 @@
         </p:nvSpPr>
         <p:spPr>
           <a:xfrm>
-            <a:off x="142844" y="1000108"/>
+            <a:off x="142844" y="1059404"/>
             <a:ext cx="7429552" cy="369332"/>
           </a:xfrm>
           <a:prstGeom prst="rect">
@@ -2810,77 +2657,7 @@
                 <a:latin typeface="標楷體" pitchFamily="65" charset="-120"/>
                 <a:ea typeface="標楷體" pitchFamily="65" charset="-120"/>
               </a:rPr>
-              <a:t>接上內視鏡，顯示</a:t>
-            </a:r>
-            <a:r>
-              <a:rPr lang="zh-TW" altLang="en-US" dirty="0" smtClean="0">
-                <a:latin typeface="標楷體" pitchFamily="65" charset="-120"/>
-                <a:ea typeface="標楷體" pitchFamily="65" charset="-120"/>
-              </a:rPr>
-              <a:t>內視鏡</a:t>
-            </a:r>
-            <a:r>
-              <a:rPr lang="zh-TW" altLang="en-US" dirty="0" smtClean="0">
-                <a:latin typeface="標楷體" pitchFamily="65" charset="-120"/>
-                <a:ea typeface="標楷體" pitchFamily="65" charset="-120"/>
-              </a:rPr>
-              <a:t>序號、</a:t>
-            </a:r>
-            <a:r>
-              <a:rPr lang="zh-TW" altLang="en-US" dirty="0" smtClean="0">
-                <a:latin typeface="標楷體" pitchFamily="65" charset="-120"/>
-                <a:ea typeface="標楷體" pitchFamily="65" charset="-120"/>
-              </a:rPr>
-              <a:t>內視鏡</a:t>
-            </a:r>
-            <a:r>
-              <a:rPr lang="zh-TW" altLang="en-US" dirty="0" smtClean="0">
-                <a:latin typeface="標楷體" pitchFamily="65" charset="-120"/>
-                <a:ea typeface="標楷體" pitchFamily="65" charset="-120"/>
-              </a:rPr>
-              <a:t>已使用</a:t>
-            </a:r>
-            <a:r>
-              <a:rPr lang="zh-TW" altLang="en-US" dirty="0" smtClean="0">
-                <a:latin typeface="標楷體" pitchFamily="65" charset="-120"/>
-                <a:ea typeface="標楷體" pitchFamily="65" charset="-120"/>
-              </a:rPr>
-              <a:t>時間</a:t>
-            </a:r>
-            <a:r>
-              <a:rPr lang="zh-TW" altLang="en-US" dirty="0" smtClean="0">
-                <a:latin typeface="標楷體" pitchFamily="65" charset="-120"/>
-                <a:ea typeface="標楷體" pitchFamily="65" charset="-120"/>
-              </a:rPr>
-              <a:t>、</a:t>
-            </a:r>
-            <a:r>
-              <a:rPr lang="zh-TW" altLang="en-US" dirty="0" smtClean="0">
-                <a:latin typeface="標楷體" pitchFamily="65" charset="-120"/>
-                <a:ea typeface="標楷體" pitchFamily="65" charset="-120"/>
-              </a:rPr>
-              <a:t>內視鏡</a:t>
-            </a:r>
-            <a:r>
-              <a:rPr lang="zh-TW" altLang="en-US" dirty="0" smtClean="0">
-                <a:latin typeface="標楷體" pitchFamily="65" charset="-120"/>
-                <a:ea typeface="標楷體" pitchFamily="65" charset="-120"/>
-              </a:rPr>
-              <a:t>可使用</a:t>
-            </a:r>
-            <a:r>
-              <a:rPr lang="zh-TW" altLang="en-US" dirty="0" smtClean="0">
-                <a:latin typeface="標楷體" pitchFamily="65" charset="-120"/>
-                <a:ea typeface="標楷體" pitchFamily="65" charset="-120"/>
-              </a:rPr>
-              <a:t>時間</a:t>
-            </a:r>
-            <a:r>
-              <a:rPr lang="zh-TW" altLang="en-US" dirty="0" smtClean="0">
-                <a:latin typeface="標楷體" pitchFamily="65" charset="-120"/>
-                <a:ea typeface="標楷體" pitchFamily="65" charset="-120"/>
-              </a:rPr>
-              <a:t>。</a:t>
+              <a:t>接上內視鏡，顯示內視鏡序號、內視鏡已使用時間、內視鏡可使用時間。</a:t>
             </a:r>
             <a:endParaRPr lang="en-US" altLang="zh-TW" dirty="0" smtClean="0">
               <a:latin typeface="標楷體" pitchFamily="65" charset="-120"/>
@@ -2957,7 +2734,7 @@
         </p:nvSpPr>
         <p:spPr>
           <a:xfrm>
-            <a:off x="142844" y="1000108"/>
+            <a:off x="142844" y="1059404"/>
             <a:ext cx="6929486" cy="369332"/>
           </a:xfrm>
           <a:prstGeom prst="rect">
@@ -3077,7 +2854,7 @@
         </p:nvSpPr>
         <p:spPr>
           <a:xfrm>
-            <a:off x="142844" y="1000108"/>
+            <a:off x="142844" y="1068157"/>
             <a:ext cx="7358114" cy="646331"/>
           </a:xfrm>
           <a:prstGeom prst="rect">
@@ -3096,35 +2873,7 @@
                 <a:latin typeface="標楷體" pitchFamily="65" charset="-120"/>
                 <a:ea typeface="標楷體" pitchFamily="65" charset="-120"/>
               </a:rPr>
-              <a:t>啟動</a:t>
-            </a:r>
-            <a:r>
-              <a:rPr lang="zh-TW" altLang="en-US" dirty="0" smtClean="0">
-                <a:latin typeface="標楷體" pitchFamily="65" charset="-120"/>
-                <a:ea typeface="標楷體" pitchFamily="65" charset="-120"/>
-              </a:rPr>
-              <a:t>一分鐘</a:t>
-            </a:r>
-            <a:r>
-              <a:rPr lang="zh-TW" altLang="en-US" dirty="0" smtClean="0">
-                <a:latin typeface="標楷體" pitchFamily="65" charset="-120"/>
-                <a:ea typeface="標楷體" pitchFamily="65" charset="-120"/>
-              </a:rPr>
-              <a:t>內，主機重啟，或內視鏡拔除再接上，</a:t>
-            </a:r>
-            <a:r>
-              <a:rPr lang="zh-TW" altLang="en-US" dirty="0" smtClean="0">
-                <a:latin typeface="標楷體" pitchFamily="65" charset="-120"/>
-                <a:ea typeface="標楷體" pitchFamily="65" charset="-120"/>
-              </a:rPr>
-              <a:t>視同全新內視鏡</a:t>
-            </a:r>
-            <a:r>
-              <a:rPr lang="zh-TW" altLang="en-US" dirty="0" smtClean="0">
-                <a:latin typeface="標楷體" pitchFamily="65" charset="-120"/>
-                <a:ea typeface="標楷體" pitchFamily="65" charset="-120"/>
-              </a:rPr>
-              <a:t>。</a:t>
+              <a:t>啟動一分鐘內，主機重啟，或內視鏡拔除再接上，視同全新內視鏡。</a:t>
             </a:r>
             <a:endParaRPr lang="en-US" altLang="zh-TW" dirty="0" smtClean="0">
               <a:latin typeface="標楷體" pitchFamily="65" charset="-120"/>
@@ -3137,14 +2886,7 @@
                 <a:latin typeface="標楷體" pitchFamily="65" charset="-120"/>
                 <a:ea typeface="標楷體" pitchFamily="65" charset="-120"/>
               </a:rPr>
-              <a:t>啟動一分鐘後，按停止或主機重啟，時間都會繼續跑</a:t>
-            </a:r>
-            <a:r>
-              <a:rPr lang="zh-TW" altLang="en-US" dirty="0" smtClean="0">
-                <a:latin typeface="標楷體" pitchFamily="65" charset="-120"/>
-                <a:ea typeface="標楷體" pitchFamily="65" charset="-120"/>
-              </a:rPr>
-              <a:t>。</a:t>
+              <a:t>啟動一分鐘後，按停止或主機重啟，時間都會繼續跑。</a:t>
             </a:r>
             <a:endParaRPr lang="en-US" altLang="zh-TW" dirty="0" smtClean="0">
               <a:latin typeface="標楷體" pitchFamily="65" charset="-120"/>
@@ -3253,7 +2995,7 @@
         </p:nvSpPr>
         <p:spPr>
           <a:xfrm>
-            <a:off x="142844" y="1000108"/>
+            <a:off x="142844" y="1059404"/>
             <a:ext cx="6929486" cy="369332"/>
           </a:xfrm>
           <a:prstGeom prst="rect">

</xml_diff>